<commit_message>
neg disagg fg work
</commit_message>
<xml_diff>
--- a/doc/figures/negative-disaggregation-feature-guide/figures.pptx
+++ b/doc/figures/negative-disaggregation-feature-guide/figures.pptx
@@ -3926,6 +3926,372 @@
           </a:p>
         </p:txBody>
       </p:sp>
+      <p:sp>
+        <p:nvSpPr>
+          <p:cNvPr id="17" name="Down Arrow 16">
+            <a:extLst>
+              <a:ext uri="{FF2B5EF4-FFF2-40B4-BE49-F238E27FC236}">
+                <a16:creationId xmlns:a16="http://schemas.microsoft.com/office/drawing/2014/main" id="{4FD9BC1A-C2D7-C346-9530-8CB156B42026}"/>
+              </a:ext>
+            </a:extLst>
+          </p:cNvPr>
+          <p:cNvSpPr/>
+          <p:nvPr/>
+        </p:nvSpPr>
+        <p:spPr>
+          <a:xfrm rot="3652973">
+            <a:off x="3342781" y="2100819"/>
+            <a:ext cx="195238" cy="210256"/>
+          </a:xfrm>
+          <a:prstGeom prst="downArrow">
+            <a:avLst/>
+          </a:prstGeom>
+          <a:solidFill>
+            <a:srgbClr val="00B050"/>
+          </a:solidFill>
+          <a:ln>
+            <a:solidFill>
+              <a:schemeClr val="accent6">
+                <a:lumMod val="50000"/>
+              </a:schemeClr>
+            </a:solidFill>
+          </a:ln>
+        </p:spPr>
+        <p:style>
+          <a:lnRef idx="2">
+            <a:schemeClr val="accent1">
+              <a:shade val="50000"/>
+            </a:schemeClr>
+          </a:lnRef>
+          <a:fillRef idx="1">
+            <a:schemeClr val="accent1"/>
+          </a:fillRef>
+          <a:effectRef idx="0">
+            <a:schemeClr val="accent1"/>
+          </a:effectRef>
+          <a:fontRef idx="minor">
+            <a:schemeClr val="lt1"/>
+          </a:fontRef>
+        </p:style>
+        <p:txBody>
+          <a:bodyPr rot="0" spcFirstLastPara="0" vertOverflow="overflow" horzOverflow="overflow" vert="horz" wrap="square" lIns="91440" tIns="45720" rIns="91440" bIns="45720" numCol="1" spcCol="0" rtlCol="0" fromWordArt="0" anchor="ctr" anchorCtr="0" forceAA="0" compatLnSpc="1">
+            <a:prstTxWarp prst="textNoShape">
+              <a:avLst/>
+            </a:prstTxWarp>
+            <a:noAutofit/>
+          </a:bodyPr>
+          <a:lstStyle/>
+          <a:p>
+            <a:pPr algn="ctr"/>
+            <a:endParaRPr lang="en-US"/>
+          </a:p>
+        </p:txBody>
+      </p:sp>
+      <p:sp>
+        <p:nvSpPr>
+          <p:cNvPr id="18" name="Down Arrow 17">
+            <a:extLst>
+              <a:ext uri="{FF2B5EF4-FFF2-40B4-BE49-F238E27FC236}">
+                <a16:creationId xmlns:a16="http://schemas.microsoft.com/office/drawing/2014/main" id="{71A5BB41-9263-A841-A899-0C909290CFEE}"/>
+              </a:ext>
+            </a:extLst>
+          </p:cNvPr>
+          <p:cNvSpPr/>
+          <p:nvPr/>
+        </p:nvSpPr>
+        <p:spPr>
+          <a:xfrm rot="10800000">
+            <a:off x="3590046" y="1326505"/>
+            <a:ext cx="195238" cy="210256"/>
+          </a:xfrm>
+          <a:prstGeom prst="downArrow">
+            <a:avLst/>
+          </a:prstGeom>
+          <a:solidFill>
+            <a:srgbClr val="00B050"/>
+          </a:solidFill>
+          <a:ln>
+            <a:solidFill>
+              <a:schemeClr val="accent6">
+                <a:lumMod val="50000"/>
+              </a:schemeClr>
+            </a:solidFill>
+          </a:ln>
+        </p:spPr>
+        <p:style>
+          <a:lnRef idx="2">
+            <a:schemeClr val="accent1">
+              <a:shade val="50000"/>
+            </a:schemeClr>
+          </a:lnRef>
+          <a:fillRef idx="1">
+            <a:schemeClr val="accent1"/>
+          </a:fillRef>
+          <a:effectRef idx="0">
+            <a:schemeClr val="accent1"/>
+          </a:effectRef>
+          <a:fontRef idx="minor">
+            <a:schemeClr val="lt1"/>
+          </a:fontRef>
+        </p:style>
+        <p:txBody>
+          <a:bodyPr rot="0" spcFirstLastPara="0" vertOverflow="overflow" horzOverflow="overflow" vert="horz" wrap="square" lIns="91440" tIns="45720" rIns="91440" bIns="45720" numCol="1" spcCol="0" rtlCol="0" fromWordArt="0" anchor="ctr" anchorCtr="0" forceAA="0" compatLnSpc="1">
+            <a:prstTxWarp prst="textNoShape">
+              <a:avLst/>
+            </a:prstTxWarp>
+            <a:noAutofit/>
+          </a:bodyPr>
+          <a:lstStyle/>
+          <a:p>
+            <a:pPr algn="ctr"/>
+            <a:endParaRPr lang="en-US"/>
+          </a:p>
+        </p:txBody>
+      </p:sp>
+      <p:sp>
+        <p:nvSpPr>
+          <p:cNvPr id="19" name="Down Arrow 18">
+            <a:extLst>
+              <a:ext uri="{FF2B5EF4-FFF2-40B4-BE49-F238E27FC236}">
+                <a16:creationId xmlns:a16="http://schemas.microsoft.com/office/drawing/2014/main" id="{10CE9E0C-BB33-8E42-88FD-C3EF0B3F62DC}"/>
+              </a:ext>
+            </a:extLst>
+          </p:cNvPr>
+          <p:cNvSpPr/>
+          <p:nvPr/>
+        </p:nvSpPr>
+        <p:spPr>
+          <a:xfrm rot="10800000">
+            <a:off x="3908408" y="1327499"/>
+            <a:ext cx="195238" cy="210256"/>
+          </a:xfrm>
+          <a:prstGeom prst="downArrow">
+            <a:avLst/>
+          </a:prstGeom>
+          <a:solidFill>
+            <a:srgbClr val="00B050"/>
+          </a:solidFill>
+          <a:ln>
+            <a:solidFill>
+              <a:schemeClr val="accent6">
+                <a:lumMod val="50000"/>
+              </a:schemeClr>
+            </a:solidFill>
+          </a:ln>
+        </p:spPr>
+        <p:style>
+          <a:lnRef idx="2">
+            <a:schemeClr val="accent1">
+              <a:shade val="50000"/>
+            </a:schemeClr>
+          </a:lnRef>
+          <a:fillRef idx="1">
+            <a:schemeClr val="accent1"/>
+          </a:fillRef>
+          <a:effectRef idx="0">
+            <a:schemeClr val="accent1"/>
+          </a:effectRef>
+          <a:fontRef idx="minor">
+            <a:schemeClr val="lt1"/>
+          </a:fontRef>
+        </p:style>
+        <p:txBody>
+          <a:bodyPr rot="0" spcFirstLastPara="0" vertOverflow="overflow" horzOverflow="overflow" vert="horz" wrap="square" lIns="91440" tIns="45720" rIns="91440" bIns="45720" numCol="1" spcCol="0" rtlCol="0" fromWordArt="0" anchor="ctr" anchorCtr="0" forceAA="0" compatLnSpc="1">
+            <a:prstTxWarp prst="textNoShape">
+              <a:avLst/>
+            </a:prstTxWarp>
+            <a:noAutofit/>
+          </a:bodyPr>
+          <a:lstStyle/>
+          <a:p>
+            <a:pPr algn="ctr"/>
+            <a:endParaRPr lang="en-US"/>
+          </a:p>
+        </p:txBody>
+      </p:sp>
+      <p:sp>
+        <p:nvSpPr>
+          <p:cNvPr id="20" name="Down Arrow 19">
+            <a:extLst>
+              <a:ext uri="{FF2B5EF4-FFF2-40B4-BE49-F238E27FC236}">
+                <a16:creationId xmlns:a16="http://schemas.microsoft.com/office/drawing/2014/main" id="{201C9CFE-ED2B-A147-94C5-04C06CBFECAE}"/>
+              </a:ext>
+            </a:extLst>
+          </p:cNvPr>
+          <p:cNvSpPr/>
+          <p:nvPr/>
+        </p:nvSpPr>
+        <p:spPr>
+          <a:xfrm rot="17199668">
+            <a:off x="3129674" y="2076192"/>
+            <a:ext cx="195238" cy="210256"/>
+          </a:xfrm>
+          <a:prstGeom prst="downArrow">
+            <a:avLst/>
+          </a:prstGeom>
+          <a:solidFill>
+            <a:srgbClr val="FF0000"/>
+          </a:solidFill>
+          <a:ln>
+            <a:solidFill>
+              <a:schemeClr val="accent6">
+                <a:lumMod val="50000"/>
+              </a:schemeClr>
+            </a:solidFill>
+          </a:ln>
+        </p:spPr>
+        <p:style>
+          <a:lnRef idx="2">
+            <a:schemeClr val="accent1">
+              <a:shade val="50000"/>
+            </a:schemeClr>
+          </a:lnRef>
+          <a:fillRef idx="1">
+            <a:schemeClr val="accent1"/>
+          </a:fillRef>
+          <a:effectRef idx="0">
+            <a:schemeClr val="accent1"/>
+          </a:effectRef>
+          <a:fontRef idx="minor">
+            <a:schemeClr val="lt1"/>
+          </a:fontRef>
+        </p:style>
+        <p:txBody>
+          <a:bodyPr rot="0" spcFirstLastPara="0" vertOverflow="overflow" horzOverflow="overflow" vert="horz" wrap="square" lIns="91440" tIns="45720" rIns="91440" bIns="45720" numCol="1" spcCol="0" rtlCol="0" fromWordArt="0" anchor="ctr" anchorCtr="0" forceAA="0" compatLnSpc="1">
+            <a:prstTxWarp prst="textNoShape">
+              <a:avLst/>
+            </a:prstTxWarp>
+            <a:noAutofit/>
+          </a:bodyPr>
+          <a:lstStyle/>
+          <a:p>
+            <a:pPr algn="ctr"/>
+            <a:endParaRPr lang="en-US"/>
+          </a:p>
+        </p:txBody>
+      </p:sp>
+      <p:sp>
+        <p:nvSpPr>
+          <p:cNvPr id="21" name="Down Arrow 20">
+            <a:extLst>
+              <a:ext uri="{FF2B5EF4-FFF2-40B4-BE49-F238E27FC236}">
+                <a16:creationId xmlns:a16="http://schemas.microsoft.com/office/drawing/2014/main" id="{D103AFB3-4B22-AF43-98EF-E81A34A1A0C1}"/>
+              </a:ext>
+            </a:extLst>
+          </p:cNvPr>
+          <p:cNvSpPr/>
+          <p:nvPr/>
+        </p:nvSpPr>
+        <p:spPr>
+          <a:xfrm rot="10800000">
+            <a:off x="2455957" y="1326505"/>
+            <a:ext cx="195238" cy="210256"/>
+          </a:xfrm>
+          <a:prstGeom prst="downArrow">
+            <a:avLst/>
+          </a:prstGeom>
+          <a:solidFill>
+            <a:srgbClr val="FF0000"/>
+          </a:solidFill>
+          <a:ln>
+            <a:solidFill>
+              <a:schemeClr val="accent6">
+                <a:lumMod val="50000"/>
+              </a:schemeClr>
+            </a:solidFill>
+          </a:ln>
+        </p:spPr>
+        <p:style>
+          <a:lnRef idx="2">
+            <a:schemeClr val="accent1">
+              <a:shade val="50000"/>
+            </a:schemeClr>
+          </a:lnRef>
+          <a:fillRef idx="1">
+            <a:schemeClr val="accent1"/>
+          </a:fillRef>
+          <a:effectRef idx="0">
+            <a:schemeClr val="accent1"/>
+          </a:effectRef>
+          <a:fontRef idx="minor">
+            <a:schemeClr val="lt1"/>
+          </a:fontRef>
+        </p:style>
+        <p:txBody>
+          <a:bodyPr rot="0" spcFirstLastPara="0" vertOverflow="overflow" horzOverflow="overflow" vert="horz" wrap="square" lIns="91440" tIns="45720" rIns="91440" bIns="45720" numCol="1" spcCol="0" rtlCol="0" fromWordArt="0" anchor="ctr" anchorCtr="0" forceAA="0" compatLnSpc="1">
+            <a:prstTxWarp prst="textNoShape">
+              <a:avLst/>
+            </a:prstTxWarp>
+            <a:noAutofit/>
+          </a:bodyPr>
+          <a:lstStyle/>
+          <a:p>
+            <a:pPr algn="ctr"/>
+            <a:endParaRPr lang="en-US"/>
+          </a:p>
+        </p:txBody>
+      </p:sp>
+      <p:sp>
+        <p:nvSpPr>
+          <p:cNvPr id="22" name="Down Arrow 21">
+            <a:extLst>
+              <a:ext uri="{FF2B5EF4-FFF2-40B4-BE49-F238E27FC236}">
+                <a16:creationId xmlns:a16="http://schemas.microsoft.com/office/drawing/2014/main" id="{30E6696B-76F7-5940-98F6-254C98C0C585}"/>
+              </a:ext>
+            </a:extLst>
+          </p:cNvPr>
+          <p:cNvSpPr/>
+          <p:nvPr/>
+        </p:nvSpPr>
+        <p:spPr>
+          <a:xfrm rot="10800000">
+            <a:off x="2768289" y="1325928"/>
+            <a:ext cx="195238" cy="210256"/>
+          </a:xfrm>
+          <a:prstGeom prst="downArrow">
+            <a:avLst/>
+          </a:prstGeom>
+          <a:solidFill>
+            <a:srgbClr val="FF0000"/>
+          </a:solidFill>
+          <a:ln>
+            <a:solidFill>
+              <a:schemeClr val="accent6">
+                <a:lumMod val="50000"/>
+              </a:schemeClr>
+            </a:solidFill>
+          </a:ln>
+        </p:spPr>
+        <p:style>
+          <a:lnRef idx="2">
+            <a:schemeClr val="accent1">
+              <a:shade val="50000"/>
+            </a:schemeClr>
+          </a:lnRef>
+          <a:fillRef idx="1">
+            <a:schemeClr val="accent1"/>
+          </a:fillRef>
+          <a:effectRef idx="0">
+            <a:schemeClr val="accent1"/>
+          </a:effectRef>
+          <a:fontRef idx="minor">
+            <a:schemeClr val="lt1"/>
+          </a:fontRef>
+        </p:style>
+        <p:txBody>
+          <a:bodyPr rot="0" spcFirstLastPara="0" vertOverflow="overflow" horzOverflow="overflow" vert="horz" wrap="square" lIns="91440" tIns="45720" rIns="91440" bIns="45720" numCol="1" spcCol="0" rtlCol="0" fromWordArt="0" anchor="ctr" anchorCtr="0" forceAA="0" compatLnSpc="1">
+            <a:prstTxWarp prst="textNoShape">
+              <a:avLst/>
+            </a:prstTxWarp>
+            <a:noAutofit/>
+          </a:bodyPr>
+          <a:lstStyle/>
+          <a:p>
+            <a:pPr algn="ctr"/>
+            <a:endParaRPr lang="en-US"/>
+          </a:p>
+        </p:txBody>
+      </p:sp>
     </p:spTree>
     <p:extLst>
       <p:ext uri="{BB962C8B-B14F-4D97-AF65-F5344CB8AC3E}">

</xml_diff>

<commit_message>
neg disagg fg progress
</commit_message>
<xml_diff>
--- a/doc/figures/negative-disaggregation-feature-guide/figures.pptx
+++ b/doc/figures/negative-disaggregation-feature-guide/figures.pptx
@@ -4803,6 +4803,250 @@
           </a:p>
         </p:txBody>
       </p:sp>
+      <p:sp>
+        <p:nvSpPr>
+          <p:cNvPr id="13" name="Down Arrow 12">
+            <a:extLst>
+              <a:ext uri="{FF2B5EF4-FFF2-40B4-BE49-F238E27FC236}">
+                <a16:creationId xmlns:a16="http://schemas.microsoft.com/office/drawing/2014/main" id="{1EBE5521-BB81-1543-96FE-5DDE343F9B9D}"/>
+              </a:ext>
+            </a:extLst>
+          </p:cNvPr>
+          <p:cNvSpPr/>
+          <p:nvPr/>
+        </p:nvSpPr>
+        <p:spPr>
+          <a:xfrm rot="10800000">
+            <a:off x="3590046" y="1326505"/>
+            <a:ext cx="195238" cy="210256"/>
+          </a:xfrm>
+          <a:prstGeom prst="downArrow">
+            <a:avLst/>
+          </a:prstGeom>
+          <a:solidFill>
+            <a:srgbClr val="FF0000"/>
+          </a:solidFill>
+          <a:ln>
+            <a:solidFill>
+              <a:schemeClr val="accent6">
+                <a:lumMod val="50000"/>
+              </a:schemeClr>
+            </a:solidFill>
+          </a:ln>
+        </p:spPr>
+        <p:style>
+          <a:lnRef idx="2">
+            <a:schemeClr val="accent1">
+              <a:shade val="50000"/>
+            </a:schemeClr>
+          </a:lnRef>
+          <a:fillRef idx="1">
+            <a:schemeClr val="accent1"/>
+          </a:fillRef>
+          <a:effectRef idx="0">
+            <a:schemeClr val="accent1"/>
+          </a:effectRef>
+          <a:fontRef idx="minor">
+            <a:schemeClr val="lt1"/>
+          </a:fontRef>
+        </p:style>
+        <p:txBody>
+          <a:bodyPr rot="0" spcFirstLastPara="0" vertOverflow="overflow" horzOverflow="overflow" vert="horz" wrap="square" lIns="91440" tIns="45720" rIns="91440" bIns="45720" numCol="1" spcCol="0" rtlCol="0" fromWordArt="0" anchor="ctr" anchorCtr="0" forceAA="0" compatLnSpc="1">
+            <a:prstTxWarp prst="textNoShape">
+              <a:avLst/>
+            </a:prstTxWarp>
+            <a:noAutofit/>
+          </a:bodyPr>
+          <a:lstStyle/>
+          <a:p>
+            <a:pPr algn="ctr"/>
+            <a:endParaRPr lang="en-US"/>
+          </a:p>
+        </p:txBody>
+      </p:sp>
+      <p:sp>
+        <p:nvSpPr>
+          <p:cNvPr id="15" name="Down Arrow 14">
+            <a:extLst>
+              <a:ext uri="{FF2B5EF4-FFF2-40B4-BE49-F238E27FC236}">
+                <a16:creationId xmlns:a16="http://schemas.microsoft.com/office/drawing/2014/main" id="{B105A94F-FAC6-E949-8189-4AAC0EF05B04}"/>
+              </a:ext>
+            </a:extLst>
+          </p:cNvPr>
+          <p:cNvSpPr/>
+          <p:nvPr/>
+        </p:nvSpPr>
+        <p:spPr>
+          <a:xfrm rot="10800000">
+            <a:off x="3908408" y="1327499"/>
+            <a:ext cx="195238" cy="210256"/>
+          </a:xfrm>
+          <a:prstGeom prst="downArrow">
+            <a:avLst/>
+          </a:prstGeom>
+          <a:solidFill>
+            <a:srgbClr val="FF0000"/>
+          </a:solidFill>
+          <a:ln>
+            <a:solidFill>
+              <a:schemeClr val="accent6">
+                <a:lumMod val="50000"/>
+              </a:schemeClr>
+            </a:solidFill>
+          </a:ln>
+        </p:spPr>
+        <p:style>
+          <a:lnRef idx="2">
+            <a:schemeClr val="accent1">
+              <a:shade val="50000"/>
+            </a:schemeClr>
+          </a:lnRef>
+          <a:fillRef idx="1">
+            <a:schemeClr val="accent1"/>
+          </a:fillRef>
+          <a:effectRef idx="0">
+            <a:schemeClr val="accent1"/>
+          </a:effectRef>
+          <a:fontRef idx="minor">
+            <a:schemeClr val="lt1"/>
+          </a:fontRef>
+        </p:style>
+        <p:txBody>
+          <a:bodyPr rot="0" spcFirstLastPara="0" vertOverflow="overflow" horzOverflow="overflow" vert="horz" wrap="square" lIns="91440" tIns="45720" rIns="91440" bIns="45720" numCol="1" spcCol="0" rtlCol="0" fromWordArt="0" anchor="ctr" anchorCtr="0" forceAA="0" compatLnSpc="1">
+            <a:prstTxWarp prst="textNoShape">
+              <a:avLst/>
+            </a:prstTxWarp>
+            <a:noAutofit/>
+          </a:bodyPr>
+          <a:lstStyle/>
+          <a:p>
+            <a:pPr algn="ctr"/>
+            <a:endParaRPr lang="en-US"/>
+          </a:p>
+        </p:txBody>
+      </p:sp>
+      <p:sp>
+        <p:nvSpPr>
+          <p:cNvPr id="16" name="Down Arrow 15">
+            <a:extLst>
+              <a:ext uri="{FF2B5EF4-FFF2-40B4-BE49-F238E27FC236}">
+                <a16:creationId xmlns:a16="http://schemas.microsoft.com/office/drawing/2014/main" id="{A95C48B1-1B4B-F34C-A91B-7FB6D5F98ECC}"/>
+              </a:ext>
+            </a:extLst>
+          </p:cNvPr>
+          <p:cNvSpPr/>
+          <p:nvPr/>
+        </p:nvSpPr>
+        <p:spPr>
+          <a:xfrm rot="10800000">
+            <a:off x="2455957" y="1326505"/>
+            <a:ext cx="195238" cy="210256"/>
+          </a:xfrm>
+          <a:prstGeom prst="downArrow">
+            <a:avLst/>
+          </a:prstGeom>
+          <a:solidFill>
+            <a:srgbClr val="FF0000"/>
+          </a:solidFill>
+          <a:ln>
+            <a:solidFill>
+              <a:schemeClr val="accent6">
+                <a:lumMod val="50000"/>
+              </a:schemeClr>
+            </a:solidFill>
+          </a:ln>
+        </p:spPr>
+        <p:style>
+          <a:lnRef idx="2">
+            <a:schemeClr val="accent1">
+              <a:shade val="50000"/>
+            </a:schemeClr>
+          </a:lnRef>
+          <a:fillRef idx="1">
+            <a:schemeClr val="accent1"/>
+          </a:fillRef>
+          <a:effectRef idx="0">
+            <a:schemeClr val="accent1"/>
+          </a:effectRef>
+          <a:fontRef idx="minor">
+            <a:schemeClr val="lt1"/>
+          </a:fontRef>
+        </p:style>
+        <p:txBody>
+          <a:bodyPr rot="0" spcFirstLastPara="0" vertOverflow="overflow" horzOverflow="overflow" vert="horz" wrap="square" lIns="91440" tIns="45720" rIns="91440" bIns="45720" numCol="1" spcCol="0" rtlCol="0" fromWordArt="0" anchor="ctr" anchorCtr="0" forceAA="0" compatLnSpc="1">
+            <a:prstTxWarp prst="textNoShape">
+              <a:avLst/>
+            </a:prstTxWarp>
+            <a:noAutofit/>
+          </a:bodyPr>
+          <a:lstStyle/>
+          <a:p>
+            <a:pPr algn="ctr"/>
+            <a:endParaRPr lang="en-US"/>
+          </a:p>
+        </p:txBody>
+      </p:sp>
+      <p:sp>
+        <p:nvSpPr>
+          <p:cNvPr id="17" name="Down Arrow 16">
+            <a:extLst>
+              <a:ext uri="{FF2B5EF4-FFF2-40B4-BE49-F238E27FC236}">
+                <a16:creationId xmlns:a16="http://schemas.microsoft.com/office/drawing/2014/main" id="{460A26AF-5242-1140-A2BE-F875F556306E}"/>
+              </a:ext>
+            </a:extLst>
+          </p:cNvPr>
+          <p:cNvSpPr/>
+          <p:nvPr/>
+        </p:nvSpPr>
+        <p:spPr>
+          <a:xfrm rot="10800000">
+            <a:off x="2768289" y="1325928"/>
+            <a:ext cx="195238" cy="210256"/>
+          </a:xfrm>
+          <a:prstGeom prst="downArrow">
+            <a:avLst/>
+          </a:prstGeom>
+          <a:solidFill>
+            <a:srgbClr val="FF0000"/>
+          </a:solidFill>
+          <a:ln>
+            <a:solidFill>
+              <a:schemeClr val="accent6">
+                <a:lumMod val="50000"/>
+              </a:schemeClr>
+            </a:solidFill>
+          </a:ln>
+        </p:spPr>
+        <p:style>
+          <a:lnRef idx="2">
+            <a:schemeClr val="accent1">
+              <a:shade val="50000"/>
+            </a:schemeClr>
+          </a:lnRef>
+          <a:fillRef idx="1">
+            <a:schemeClr val="accent1"/>
+          </a:fillRef>
+          <a:effectRef idx="0">
+            <a:schemeClr val="accent1"/>
+          </a:effectRef>
+          <a:fontRef idx="minor">
+            <a:schemeClr val="lt1"/>
+          </a:fontRef>
+        </p:style>
+        <p:txBody>
+          <a:bodyPr rot="0" spcFirstLastPara="0" vertOverflow="overflow" horzOverflow="overflow" vert="horz" wrap="square" lIns="91440" tIns="45720" rIns="91440" bIns="45720" numCol="1" spcCol="0" rtlCol="0" fromWordArt="0" anchor="ctr" anchorCtr="0" forceAA="0" compatLnSpc="1">
+            <a:prstTxWarp prst="textNoShape">
+              <a:avLst/>
+            </a:prstTxWarp>
+            <a:noAutofit/>
+          </a:bodyPr>
+          <a:lstStyle/>
+          <a:p>
+            <a:pPr algn="ctr"/>
+            <a:endParaRPr lang="en-US"/>
+          </a:p>
+        </p:txBody>
+      </p:sp>
     </p:spTree>
     <p:extLst>
       <p:ext uri="{BB962C8B-B14F-4D97-AF65-F5344CB8AC3E}">
@@ -5673,6 +5917,250 @@
         </p:style>
         <p:txBody>
           <a:bodyPr rtlCol="0" anchor="ctr"/>
+          <a:lstStyle/>
+          <a:p>
+            <a:pPr algn="ctr"/>
+            <a:endParaRPr lang="en-US"/>
+          </a:p>
+        </p:txBody>
+      </p:sp>
+      <p:sp>
+        <p:nvSpPr>
+          <p:cNvPr id="19" name="Down Arrow 18">
+            <a:extLst>
+              <a:ext uri="{FF2B5EF4-FFF2-40B4-BE49-F238E27FC236}">
+                <a16:creationId xmlns:a16="http://schemas.microsoft.com/office/drawing/2014/main" id="{01692F03-C402-3E48-93C5-3E6ECC89B0EA}"/>
+              </a:ext>
+            </a:extLst>
+          </p:cNvPr>
+          <p:cNvSpPr/>
+          <p:nvPr/>
+        </p:nvSpPr>
+        <p:spPr>
+          <a:xfrm rot="10800000">
+            <a:off x="3590046" y="1326505"/>
+            <a:ext cx="195238" cy="210256"/>
+          </a:xfrm>
+          <a:prstGeom prst="downArrow">
+            <a:avLst/>
+          </a:prstGeom>
+          <a:solidFill>
+            <a:srgbClr val="FF0000"/>
+          </a:solidFill>
+          <a:ln>
+            <a:solidFill>
+              <a:schemeClr val="accent6">
+                <a:lumMod val="50000"/>
+              </a:schemeClr>
+            </a:solidFill>
+          </a:ln>
+        </p:spPr>
+        <p:style>
+          <a:lnRef idx="2">
+            <a:schemeClr val="accent1">
+              <a:shade val="50000"/>
+            </a:schemeClr>
+          </a:lnRef>
+          <a:fillRef idx="1">
+            <a:schemeClr val="accent1"/>
+          </a:fillRef>
+          <a:effectRef idx="0">
+            <a:schemeClr val="accent1"/>
+          </a:effectRef>
+          <a:fontRef idx="minor">
+            <a:schemeClr val="lt1"/>
+          </a:fontRef>
+        </p:style>
+        <p:txBody>
+          <a:bodyPr rot="0" spcFirstLastPara="0" vertOverflow="overflow" horzOverflow="overflow" vert="horz" wrap="square" lIns="91440" tIns="45720" rIns="91440" bIns="45720" numCol="1" spcCol="0" rtlCol="0" fromWordArt="0" anchor="ctr" anchorCtr="0" forceAA="0" compatLnSpc="1">
+            <a:prstTxWarp prst="textNoShape">
+              <a:avLst/>
+            </a:prstTxWarp>
+            <a:noAutofit/>
+          </a:bodyPr>
+          <a:lstStyle/>
+          <a:p>
+            <a:pPr algn="ctr"/>
+            <a:endParaRPr lang="en-US"/>
+          </a:p>
+        </p:txBody>
+      </p:sp>
+      <p:sp>
+        <p:nvSpPr>
+          <p:cNvPr id="21" name="Down Arrow 20">
+            <a:extLst>
+              <a:ext uri="{FF2B5EF4-FFF2-40B4-BE49-F238E27FC236}">
+                <a16:creationId xmlns:a16="http://schemas.microsoft.com/office/drawing/2014/main" id="{4D12ACF0-0C31-194B-B9AB-CC36EC55652F}"/>
+              </a:ext>
+            </a:extLst>
+          </p:cNvPr>
+          <p:cNvSpPr/>
+          <p:nvPr/>
+        </p:nvSpPr>
+        <p:spPr>
+          <a:xfrm rot="10800000">
+            <a:off x="3908408" y="1327499"/>
+            <a:ext cx="195238" cy="210256"/>
+          </a:xfrm>
+          <a:prstGeom prst="downArrow">
+            <a:avLst/>
+          </a:prstGeom>
+          <a:solidFill>
+            <a:srgbClr val="FF0000"/>
+          </a:solidFill>
+          <a:ln>
+            <a:solidFill>
+              <a:schemeClr val="accent6">
+                <a:lumMod val="50000"/>
+              </a:schemeClr>
+            </a:solidFill>
+          </a:ln>
+        </p:spPr>
+        <p:style>
+          <a:lnRef idx="2">
+            <a:schemeClr val="accent1">
+              <a:shade val="50000"/>
+            </a:schemeClr>
+          </a:lnRef>
+          <a:fillRef idx="1">
+            <a:schemeClr val="accent1"/>
+          </a:fillRef>
+          <a:effectRef idx="0">
+            <a:schemeClr val="accent1"/>
+          </a:effectRef>
+          <a:fontRef idx="minor">
+            <a:schemeClr val="lt1"/>
+          </a:fontRef>
+        </p:style>
+        <p:txBody>
+          <a:bodyPr rot="0" spcFirstLastPara="0" vertOverflow="overflow" horzOverflow="overflow" vert="horz" wrap="square" lIns="91440" tIns="45720" rIns="91440" bIns="45720" numCol="1" spcCol="0" rtlCol="0" fromWordArt="0" anchor="ctr" anchorCtr="0" forceAA="0" compatLnSpc="1">
+            <a:prstTxWarp prst="textNoShape">
+              <a:avLst/>
+            </a:prstTxWarp>
+            <a:noAutofit/>
+          </a:bodyPr>
+          <a:lstStyle/>
+          <a:p>
+            <a:pPr algn="ctr"/>
+            <a:endParaRPr lang="en-US"/>
+          </a:p>
+        </p:txBody>
+      </p:sp>
+      <p:sp>
+        <p:nvSpPr>
+          <p:cNvPr id="22" name="Down Arrow 21">
+            <a:extLst>
+              <a:ext uri="{FF2B5EF4-FFF2-40B4-BE49-F238E27FC236}">
+                <a16:creationId xmlns:a16="http://schemas.microsoft.com/office/drawing/2014/main" id="{CC766055-8FFE-5846-AE4C-1A6F26E5ADFD}"/>
+              </a:ext>
+            </a:extLst>
+          </p:cNvPr>
+          <p:cNvSpPr/>
+          <p:nvPr/>
+        </p:nvSpPr>
+        <p:spPr>
+          <a:xfrm rot="10800000">
+            <a:off x="2455957" y="1326505"/>
+            <a:ext cx="195238" cy="210256"/>
+          </a:xfrm>
+          <a:prstGeom prst="downArrow">
+            <a:avLst/>
+          </a:prstGeom>
+          <a:solidFill>
+            <a:srgbClr val="FF0000"/>
+          </a:solidFill>
+          <a:ln>
+            <a:solidFill>
+              <a:schemeClr val="accent6">
+                <a:lumMod val="50000"/>
+              </a:schemeClr>
+            </a:solidFill>
+          </a:ln>
+        </p:spPr>
+        <p:style>
+          <a:lnRef idx="2">
+            <a:schemeClr val="accent1">
+              <a:shade val="50000"/>
+            </a:schemeClr>
+          </a:lnRef>
+          <a:fillRef idx="1">
+            <a:schemeClr val="accent1"/>
+          </a:fillRef>
+          <a:effectRef idx="0">
+            <a:schemeClr val="accent1"/>
+          </a:effectRef>
+          <a:fontRef idx="minor">
+            <a:schemeClr val="lt1"/>
+          </a:fontRef>
+        </p:style>
+        <p:txBody>
+          <a:bodyPr rot="0" spcFirstLastPara="0" vertOverflow="overflow" horzOverflow="overflow" vert="horz" wrap="square" lIns="91440" tIns="45720" rIns="91440" bIns="45720" numCol="1" spcCol="0" rtlCol="0" fromWordArt="0" anchor="ctr" anchorCtr="0" forceAA="0" compatLnSpc="1">
+            <a:prstTxWarp prst="textNoShape">
+              <a:avLst/>
+            </a:prstTxWarp>
+            <a:noAutofit/>
+          </a:bodyPr>
+          <a:lstStyle/>
+          <a:p>
+            <a:pPr algn="ctr"/>
+            <a:endParaRPr lang="en-US"/>
+          </a:p>
+        </p:txBody>
+      </p:sp>
+      <p:sp>
+        <p:nvSpPr>
+          <p:cNvPr id="23" name="Down Arrow 22">
+            <a:extLst>
+              <a:ext uri="{FF2B5EF4-FFF2-40B4-BE49-F238E27FC236}">
+                <a16:creationId xmlns:a16="http://schemas.microsoft.com/office/drawing/2014/main" id="{D2073058-2217-1946-84A4-49496EF6B014}"/>
+              </a:ext>
+            </a:extLst>
+          </p:cNvPr>
+          <p:cNvSpPr/>
+          <p:nvPr/>
+        </p:nvSpPr>
+        <p:spPr>
+          <a:xfrm rot="10800000">
+            <a:off x="2768289" y="1325928"/>
+            <a:ext cx="195238" cy="210256"/>
+          </a:xfrm>
+          <a:prstGeom prst="downArrow">
+            <a:avLst/>
+          </a:prstGeom>
+          <a:solidFill>
+            <a:srgbClr val="FF0000"/>
+          </a:solidFill>
+          <a:ln>
+            <a:solidFill>
+              <a:schemeClr val="accent6">
+                <a:lumMod val="50000"/>
+              </a:schemeClr>
+            </a:solidFill>
+          </a:ln>
+        </p:spPr>
+        <p:style>
+          <a:lnRef idx="2">
+            <a:schemeClr val="accent1">
+              <a:shade val="50000"/>
+            </a:schemeClr>
+          </a:lnRef>
+          <a:fillRef idx="1">
+            <a:schemeClr val="accent1"/>
+          </a:fillRef>
+          <a:effectRef idx="0">
+            <a:schemeClr val="accent1"/>
+          </a:effectRef>
+          <a:fontRef idx="minor">
+            <a:schemeClr val="lt1"/>
+          </a:fontRef>
+        </p:style>
+        <p:txBody>
+          <a:bodyPr rot="0" spcFirstLastPara="0" vertOverflow="overflow" horzOverflow="overflow" vert="horz" wrap="square" lIns="91440" tIns="45720" rIns="91440" bIns="45720" numCol="1" spcCol="0" rtlCol="0" fromWordArt="0" anchor="ctr" anchorCtr="0" forceAA="0" compatLnSpc="1">
+            <a:prstTxWarp prst="textNoShape">
+              <a:avLst/>
+            </a:prstTxWarp>
+            <a:noAutofit/>
+          </a:bodyPr>
           <a:lstStyle/>
           <a:p>
             <a:pPr algn="ctr"/>

</xml_diff>